<commit_message>
update models JSON with statistics
</commit_message>
<xml_diff>
--- a/supporting_material/frameword_diagramV1.pptx
+++ b/supporting_material/frameword_diagramV1.pptx
@@ -260,7 +260,7 @@
           <a:p>
             <a:fld id="{FF9317FB-B5E3-4248-B17E-0F59F14C9065}" type="datetimeFigureOut">
               <a:rPr lang="en-US" smtClean="0"/>
-              <a:t>8/31/18</a:t>
+              <a:t>9/7/18</a:t>
             </a:fld>
             <a:endParaRPr lang="en-US"/>
           </a:p>
@@ -458,7 +458,7 @@
           <a:p>
             <a:fld id="{FF9317FB-B5E3-4248-B17E-0F59F14C9065}" type="datetimeFigureOut">
               <a:rPr lang="en-US" smtClean="0"/>
-              <a:t>8/31/18</a:t>
+              <a:t>9/7/18</a:t>
             </a:fld>
             <a:endParaRPr lang="en-US"/>
           </a:p>
@@ -666,7 +666,7 @@
           <a:p>
             <a:fld id="{FF9317FB-B5E3-4248-B17E-0F59F14C9065}" type="datetimeFigureOut">
               <a:rPr lang="en-US" smtClean="0"/>
-              <a:t>8/31/18</a:t>
+              <a:t>9/7/18</a:t>
             </a:fld>
             <a:endParaRPr lang="en-US"/>
           </a:p>
@@ -864,7 +864,7 @@
           <a:p>
             <a:fld id="{FF9317FB-B5E3-4248-B17E-0F59F14C9065}" type="datetimeFigureOut">
               <a:rPr lang="en-US" smtClean="0"/>
-              <a:t>8/31/18</a:t>
+              <a:t>9/7/18</a:t>
             </a:fld>
             <a:endParaRPr lang="en-US"/>
           </a:p>
@@ -1139,7 +1139,7 @@
           <a:p>
             <a:fld id="{FF9317FB-B5E3-4248-B17E-0F59F14C9065}" type="datetimeFigureOut">
               <a:rPr lang="en-US" smtClean="0"/>
-              <a:t>8/31/18</a:t>
+              <a:t>9/7/18</a:t>
             </a:fld>
             <a:endParaRPr lang="en-US"/>
           </a:p>
@@ -1404,7 +1404,7 @@
           <a:p>
             <a:fld id="{FF9317FB-B5E3-4248-B17E-0F59F14C9065}" type="datetimeFigureOut">
               <a:rPr lang="en-US" smtClean="0"/>
-              <a:t>8/31/18</a:t>
+              <a:t>9/7/18</a:t>
             </a:fld>
             <a:endParaRPr lang="en-US"/>
           </a:p>
@@ -1816,7 +1816,7 @@
           <a:p>
             <a:fld id="{FF9317FB-B5E3-4248-B17E-0F59F14C9065}" type="datetimeFigureOut">
               <a:rPr lang="en-US" smtClean="0"/>
-              <a:t>8/31/18</a:t>
+              <a:t>9/7/18</a:t>
             </a:fld>
             <a:endParaRPr lang="en-US"/>
           </a:p>
@@ -1957,7 +1957,7 @@
           <a:p>
             <a:fld id="{FF9317FB-B5E3-4248-B17E-0F59F14C9065}" type="datetimeFigureOut">
               <a:rPr lang="en-US" smtClean="0"/>
-              <a:t>8/31/18</a:t>
+              <a:t>9/7/18</a:t>
             </a:fld>
             <a:endParaRPr lang="en-US"/>
           </a:p>
@@ -2070,7 +2070,7 @@
           <a:p>
             <a:fld id="{FF9317FB-B5E3-4248-B17E-0F59F14C9065}" type="datetimeFigureOut">
               <a:rPr lang="en-US" smtClean="0"/>
-              <a:t>8/31/18</a:t>
+              <a:t>9/7/18</a:t>
             </a:fld>
             <a:endParaRPr lang="en-US"/>
           </a:p>
@@ -2381,7 +2381,7 @@
           <a:p>
             <a:fld id="{FF9317FB-B5E3-4248-B17E-0F59F14C9065}" type="datetimeFigureOut">
               <a:rPr lang="en-US" smtClean="0"/>
-              <a:t>8/31/18</a:t>
+              <a:t>9/7/18</a:t>
             </a:fld>
             <a:endParaRPr lang="en-US"/>
           </a:p>
@@ -2669,7 +2669,7 @@
           <a:p>
             <a:fld id="{FF9317FB-B5E3-4248-B17E-0F59F14C9065}" type="datetimeFigureOut">
               <a:rPr lang="en-US" smtClean="0"/>
-              <a:t>8/31/18</a:t>
+              <a:t>9/7/18</a:t>
             </a:fld>
             <a:endParaRPr lang="en-US"/>
           </a:p>
@@ -2910,7 +2910,7 @@
           <a:p>
             <a:fld id="{FF9317FB-B5E3-4248-B17E-0F59F14C9065}" type="datetimeFigureOut">
               <a:rPr lang="en-US" smtClean="0"/>
-              <a:t>8/31/18</a:t>
+              <a:t>9/7/18</a:t>
             </a:fld>
             <a:endParaRPr lang="en-US"/>
           </a:p>
@@ -3380,10 +3380,9 @@
               </a:lnSpc>
             </a:pPr>
             <a:r>
-              <a:rPr lang="en-US" sz="2000" dirty="0" err="1"/>
+              <a:rPr lang="en-US" sz="2000" dirty="0"/>
               <a:t>ModelsAAS</a:t>
             </a:r>
-            <a:endParaRPr lang="en-US" sz="2000" dirty="0"/>
           </a:p>
         </p:txBody>
       </p:sp>
@@ -3440,10 +3439,9 @@
               </a:lnSpc>
             </a:pPr>
             <a:r>
-              <a:rPr lang="en-US" sz="2000" dirty="0" err="1"/>
+              <a:rPr lang="en-US" sz="2000" dirty="0"/>
               <a:t>ExplanationsAAS</a:t>
             </a:r>
-            <a:endParaRPr lang="en-US" sz="2000" dirty="0"/>
           </a:p>
         </p:txBody>
       </p:sp>
@@ -3500,10 +3498,9 @@
               </a:lnSpc>
             </a:pPr>
             <a:r>
-              <a:rPr lang="en-US" sz="2000" dirty="0" err="1"/>
+              <a:rPr lang="en-US" sz="2000" dirty="0"/>
               <a:t>DatasetsAAS</a:t>
             </a:r>
-            <a:endParaRPr lang="en-US" sz="2000" dirty="0"/>
           </a:p>
         </p:txBody>
       </p:sp>

</xml_diff>